<commit_message>
minor fixes and abstract
</commit_message>
<xml_diff>
--- a/Presentations/NOBUGS 2012/Posters/Continuous Build Test and Deploy/continuous_build_test_and_deployment_Poster.pptx
+++ b/Presentations/NOBUGS 2012/Posters/Continuous Build Test and Deploy/continuous_build_test_and_deployment_Poster.pptx
@@ -3926,8 +3926,8 @@
     <dgm:cxn modelId="{C7E40448-4A1B-40E1-B799-EF1206922594}" type="presOf" srcId="{64867E98-0E49-4520-99BC-30634715AFCD}" destId="{0F8AA12B-E1BA-40D2-A352-F50328A12118}" srcOrd="0" destOrd="0" presId="urn:microsoft.com/office/officeart/2005/8/layout/radial2"/>
     <dgm:cxn modelId="{96C131DC-1F5A-46CD-9DBF-82D3EC03814C}" srcId="{F8990D85-BF06-4EA2-9F60-E1F5FB69B284}" destId="{ACC50FC6-7030-41C6-B46B-C92BB0B23ED2}" srcOrd="1" destOrd="0" parTransId="{6AD11D59-04DA-40FB-A110-7E7B2E11475E}" sibTransId="{A11FF837-24A0-44A6-A7EE-7D90D4B90DBF}"/>
     <dgm:cxn modelId="{8A1BB4CE-9E9D-4EE6-AEE2-7184D07692E0}" type="presOf" srcId="{542B92E1-909B-4E6F-A87D-F3E4AA6609EF}" destId="{AE3763E3-7B38-48D8-9EE4-AC7E8664E0D8}" srcOrd="0" destOrd="0" presId="urn:microsoft.com/office/officeart/2005/8/layout/radial2"/>
+    <dgm:cxn modelId="{2571E549-A55F-4029-94E2-F9903A9AE197}" type="presOf" srcId="{ED6F155E-3785-4A71-B853-339F83E7D0E6}" destId="{4C5EC015-157D-4B48-B696-46C687FD307E}" srcOrd="0" destOrd="1" presId="urn:microsoft.com/office/officeart/2005/8/layout/radial2"/>
     <dgm:cxn modelId="{FB997BBB-F47E-4D7B-9EB1-04F260C0033A}" type="presOf" srcId="{6AD11D59-04DA-40FB-A110-7E7B2E11475E}" destId="{B50987D1-79F0-4F98-BF04-A3ECAFE35217}" srcOrd="0" destOrd="0" presId="urn:microsoft.com/office/officeart/2005/8/layout/radial2"/>
-    <dgm:cxn modelId="{2571E549-A55F-4029-94E2-F9903A9AE197}" type="presOf" srcId="{ED6F155E-3785-4A71-B853-339F83E7D0E6}" destId="{4C5EC015-157D-4B48-B696-46C687FD307E}" srcOrd="0" destOrd="1" presId="urn:microsoft.com/office/officeart/2005/8/layout/radial2"/>
     <dgm:cxn modelId="{13BEAA66-AB4F-420F-AD0E-F1E5EB39733A}" type="presOf" srcId="{C7E23AF7-4DB2-47A4-9740-3957E8BA9624}" destId="{CEA09B7C-9DB3-44CD-A2C2-9D740ADA80BE}" srcOrd="0" destOrd="0" presId="urn:microsoft.com/office/officeart/2005/8/layout/radial2"/>
     <dgm:cxn modelId="{7A74C88E-26D5-403E-9F82-ABFA3FB52C47}" type="presOf" srcId="{6726BAD5-A5E6-47B1-9C52-F294E0B1097B}" destId="{4C5EC015-157D-4B48-B696-46C687FD307E}" srcOrd="0" destOrd="0" presId="urn:microsoft.com/office/officeart/2005/8/layout/radial2"/>
     <dgm:cxn modelId="{AE212A5D-1764-4958-98CD-107FB056F506}" type="presOf" srcId="{85C090C1-022A-4756-8CF4-80AF227D155F}" destId="{C2EE49FF-D9D3-4A35-ABC9-BD17EC65C4F1}" srcOrd="0" destOrd="0" presId="urn:microsoft.com/office/officeart/2005/8/layout/radial2"/>
@@ -10349,6 +10349,7 @@
           <a:p>
             <a:fld id="{E78E1D5F-7523-4815-A670-60864F601D30}" type="datetimeFigureOut">
               <a:rPr lang="en-GB" smtClean="0"/>
+              <a:pPr/>
               <a:t>29/08/2012</a:t>
             </a:fld>
             <a:endParaRPr lang="en-GB"/>
@@ -10415,6 +10416,7 @@
           <a:p>
             <a:fld id="{2733490B-C151-4ED9-AE1B-2EC601608F54}" type="slidenum">
               <a:rPr lang="en-GB" smtClean="0"/>
+              <a:pPr/>
               <a:t>‹#›</a:t>
             </a:fld>
             <a:endParaRPr lang="en-GB"/>
@@ -13266,7 +13268,7 @@
         </p:nvGraphicFramePr>
         <p:xfrm>
           <a:off x="1066800" y="8610599"/>
-          <a:ext cx="28194000" cy="30595824"/>
+          <a:ext cx="28194000" cy="30505249"/>
         </p:xfrm>
         <a:graphic>
           <a:graphicData uri="http://schemas.openxmlformats.org/drawingml/2006/table">
@@ -14581,18 +14583,7 @@
                           <a:ea typeface="+mn-ea"/>
                           <a:cs typeface="+mn-cs"/>
                         </a:rPr>
-                        <a:t> </a:t>
-                      </a:r>
-                      <a:r>
-                        <a:rPr lang="en-GB" sz="2400" i="1" kern="1200" baseline="0" dirty="0" smtClean="0">
-                          <a:solidFill>
-                            <a:schemeClr val="tx1"/>
-                          </a:solidFill>
-                          <a:latin typeface="Corisande"/>
-                          <a:ea typeface="+mn-ea"/>
-                          <a:cs typeface="+mn-cs"/>
-                        </a:rPr>
-                        <a:t>of outstanding tickets through </a:t>
+                        <a:t> of outstanding tickets through </a:t>
                       </a:r>
                       <a:r>
                         <a:rPr lang="en-GB" sz="2400" i="1" kern="1200" baseline="0" dirty="0" err="1" smtClean="0">
@@ -14655,20 +14646,7 @@
                           <a:effectLst/>
                           <a:latin typeface="Corisande" pitchFamily="2" charset="0"/>
                         </a:rPr>
-                        <a:t>Distributed </a:t>
-                      </a:r>
-                      <a:r>
-                        <a:rPr kumimoji="0" lang="en-US" sz="5000" b="0" i="0" u="none" strike="noStrike" kern="0" cap="none" normalizeH="0" baseline="0" dirty="0" smtClean="0">
-                          <a:ln>
-                            <a:noFill/>
-                          </a:ln>
-                          <a:solidFill>
-                            <a:srgbClr val="002D55"/>
-                          </a:solidFill>
-                          <a:effectLst/>
-                          <a:latin typeface="Corisande" pitchFamily="2" charset="0"/>
-                        </a:rPr>
-                        <a:t>Version Control</a:t>
+                        <a:t>Distributed Version Control</a:t>
                       </a:r>
                     </a:p>
                     <a:p>
@@ -14731,7 +14709,7 @@
                         <a:t> is now used, with public, remote repositories </a:t>
                       </a:r>
                       <a:r>
-                        <a:rPr kumimoji="0" lang="en-US" sz="2400" b="0" i="0" u="none" strike="noStrike" kern="0" cap="none" normalizeH="0" baseline="0" dirty="0" err="1" smtClean="0">
+                        <a:rPr kumimoji="0" lang="en-US" sz="2400" b="0" i="0" u="none" strike="noStrike" kern="0" cap="none" normalizeH="0" baseline="0" dirty="0" smtClean="0">
                           <a:ln>
                             <a:noFill/>
                           </a:ln>
@@ -14742,7 +14720,7 @@
                           <a:latin typeface="Arial" pitchFamily="34" charset="0"/>
                           <a:cs typeface="Arial" pitchFamily="34" charset="0"/>
                         </a:rPr>
-                        <a:t>hoted</a:t>
+                        <a:t>hosted </a:t>
                       </a:r>
                       <a:r>
                         <a:rPr kumimoji="0" lang="en-US" sz="2400" b="0" i="0" u="none" strike="noStrike" kern="0" cap="none" normalizeH="0" baseline="0" dirty="0" smtClean="0">
@@ -14756,7 +14734,7 @@
                           <a:latin typeface="Arial" pitchFamily="34" charset="0"/>
                           <a:cs typeface="Arial" pitchFamily="34" charset="0"/>
                         </a:rPr>
-                        <a:t> on </a:t>
+                        <a:t>on </a:t>
                       </a:r>
                       <a:r>
                         <a:rPr kumimoji="0" lang="en-US" sz="2400" b="0" i="0" u="none" strike="noStrike" kern="0" cap="none" normalizeH="0" baseline="0" dirty="0" err="1" smtClean="0">
@@ -14787,7 +14765,7 @@
                         <a:t>. The ability to generate branches easily and work offline, where the major drivers. Committing to a local repository before pushing </a:t>
                       </a:r>
                       <a:r>
-                        <a:rPr kumimoji="0" lang="en-US" sz="2400" b="0" i="0" u="none" strike="noStrike" kern="0" cap="none" normalizeH="0" baseline="0" dirty="0" err="1" smtClean="0">
+                        <a:rPr kumimoji="0" lang="en-US" sz="2400" b="0" i="0" u="none" strike="noStrike" kern="0" cap="none" normalizeH="0" baseline="0" dirty="0" smtClean="0">
                           <a:ln>
                             <a:noFill/>
                           </a:ln>
@@ -14798,7 +14776,7 @@
                           <a:latin typeface="Arial" pitchFamily="34" charset="0"/>
                           <a:cs typeface="Arial" pitchFamily="34" charset="0"/>
                         </a:rPr>
-                        <a:t>changesets</a:t>
+                        <a:t>change-sets </a:t>
                       </a:r>
                       <a:r>
                         <a:rPr kumimoji="0" lang="en-US" sz="2400" b="0" i="0" u="none" strike="noStrike" kern="0" cap="none" normalizeH="0" baseline="0" dirty="0" smtClean="0">
@@ -14812,7 +14790,7 @@
                           <a:latin typeface="Arial" pitchFamily="34" charset="0"/>
                           <a:cs typeface="Arial" pitchFamily="34" charset="0"/>
                         </a:rPr>
-                        <a:t> has reduced the load on the build servers and generally lead to smaller explicit individual commits. </a:t>
+                        <a:t>has reduced the load on the build servers and generally lead to smaller explicit individual commits. </a:t>
                       </a:r>
                     </a:p>
                     <a:p>
@@ -15398,7 +15376,77 @@
                           <a:latin typeface="Arial" pitchFamily="34" charset="0"/>
                           <a:cs typeface="Arial" pitchFamily="34" charset="0"/>
                         </a:rPr>
-                        <a:t> Mocking framework. Mocking is a very powerful technique, which is highly complementary to the TDD process. Mocking interfaces allows tests to be isolated and allows TDD to proceed against parts of the codebase that don’t yet exist. We find that a combination of  Mocking and TDD, rather than TDD alone, leads to tests suites with higher coverage, better reporting and much faster execution times than is otherwise possible. Striving for mocking as part of the TDD process naturally leads to dependency injection and low coupling in the resultant code.</a:t>
+                        <a:t> Mocking framework. Mocking is a very powerful technique, which is highly complementary to the TDD process. Mocking interfaces allows tests to be isolated and allows TDD to proceed against parts of the codebase that </a:t>
+                      </a:r>
+                      <a:r>
+                        <a:rPr kumimoji="0" lang="en-US" sz="2400" b="0" i="0" u="none" strike="noStrike" kern="0" cap="none" normalizeH="0" baseline="0" dirty="0" smtClean="0">
+                          <a:ln>
+                            <a:noFill/>
+                          </a:ln>
+                          <a:solidFill>
+                            <a:schemeClr val="tx1"/>
+                          </a:solidFill>
+                          <a:effectLst/>
+                          <a:latin typeface="Arial" pitchFamily="34" charset="0"/>
+                          <a:cs typeface="Arial" pitchFamily="34" charset="0"/>
+                        </a:rPr>
+                        <a:t>do not </a:t>
+                      </a:r>
+                      <a:r>
+                        <a:rPr kumimoji="0" lang="en-US" sz="2400" b="0" i="0" u="none" strike="noStrike" kern="0" cap="none" normalizeH="0" baseline="0" dirty="0" smtClean="0">
+                          <a:ln>
+                            <a:noFill/>
+                          </a:ln>
+                          <a:solidFill>
+                            <a:schemeClr val="tx1"/>
+                          </a:solidFill>
+                          <a:effectLst/>
+                          <a:latin typeface="Arial" pitchFamily="34" charset="0"/>
+                          <a:cs typeface="Arial" pitchFamily="34" charset="0"/>
+                        </a:rPr>
+                        <a:t>yet exist. We find that a combination of  Mocking and TDD, rather than TDD alone, leads to tests suites with higher coverage, better reporting </a:t>
+                      </a:r>
+                      <a:r>
+                        <a:rPr kumimoji="0" lang="en-US" sz="2400" b="0" i="0" u="none" strike="noStrike" kern="0" cap="none" normalizeH="0" baseline="0" smtClean="0">
+                          <a:ln>
+                            <a:noFill/>
+                          </a:ln>
+                          <a:solidFill>
+                            <a:schemeClr val="tx1"/>
+                          </a:solidFill>
+                          <a:effectLst/>
+                          <a:latin typeface="Arial" pitchFamily="34" charset="0"/>
+                          <a:cs typeface="Arial" pitchFamily="34" charset="0"/>
+                        </a:rPr>
+                        <a:t>and </a:t>
+                      </a:r>
+                      <a:r>
+                        <a:rPr kumimoji="0" lang="en-US" sz="2400" b="0" i="0" u="none" strike="noStrike" kern="0" cap="none" normalizeH="0" baseline="0" smtClean="0">
+                          <a:ln>
+                            <a:noFill/>
+                          </a:ln>
+                          <a:solidFill>
+                            <a:schemeClr val="tx1"/>
+                          </a:solidFill>
+                          <a:effectLst/>
+                          <a:latin typeface="Arial" pitchFamily="34" charset="0"/>
+                          <a:cs typeface="Arial" pitchFamily="34" charset="0"/>
+                        </a:rPr>
+                        <a:t>faster </a:t>
+                      </a:r>
+                      <a:r>
+                        <a:rPr kumimoji="0" lang="en-US" sz="2400" b="0" i="0" u="none" strike="noStrike" kern="0" cap="none" normalizeH="0" baseline="0" dirty="0" smtClean="0">
+                          <a:ln>
+                            <a:noFill/>
+                          </a:ln>
+                          <a:solidFill>
+                            <a:schemeClr val="tx1"/>
+                          </a:solidFill>
+                          <a:effectLst/>
+                          <a:latin typeface="Arial" pitchFamily="34" charset="0"/>
+                          <a:cs typeface="Arial" pitchFamily="34" charset="0"/>
+                        </a:rPr>
+                        <a:t>execution times than is otherwise possible. Striving for mocking as part of the TDD process naturally leads to dependency injection and low coupling in the resultant code.</a:t>
                       </a:r>
                     </a:p>
                     <a:p>
@@ -15768,7 +15816,7 @@
                           <a:solidFill>
                             <a:schemeClr val="tx1"/>
                           </a:solidFill>
-                          <a:latin typeface="Arial" pitchFamily="34" charset="0"/>
+                          <a:latin typeface="+mj-lt"/>
                           <a:ea typeface="+mn-ea"/>
                           <a:cs typeface="Arial" pitchFamily="34" charset="0"/>
                         </a:rPr>
@@ -15794,6 +15842,52 @@
                         <a:defRPr/>
                       </a:pPr>
                       <a:endParaRPr kumimoji="0" lang="en-GB" sz="2400" b="0" i="1" u="none" strike="noStrike" kern="1200" cap="none" normalizeH="0" baseline="0" dirty="0" smtClean="0">
+                        <a:ln>
+                          <a:noFill/>
+                        </a:ln>
+                        <a:solidFill>
+                          <a:schemeClr val="tx1"/>
+                        </a:solidFill>
+                        <a:effectLst/>
+                        <a:latin typeface="Arial" pitchFamily="34" charset="0"/>
+                        <a:ea typeface="+mn-ea"/>
+                        <a:cs typeface="Arial" pitchFamily="34" charset="0"/>
+                      </a:endParaRPr>
+                    </a:p>
+                    <a:p>
+                      <a:pPr marL="0" marR="0" lvl="0" indent="0" algn="l" defTabSz="4173538" rtl="0" eaLnBrk="1" fontAlgn="base" latinLnBrk="0" hangingPunct="1">
+                        <a:lnSpc>
+                          <a:spcPct val="100000"/>
+                        </a:lnSpc>
+                        <a:spcBef>
+                          <a:spcPct val="20000"/>
+                        </a:spcBef>
+                        <a:spcAft>
+                          <a:spcPct val="0"/>
+                        </a:spcAft>
+                        <a:buClrTx/>
+                        <a:buSzTx/>
+                        <a:buFontTx/>
+                        <a:buNone/>
+                        <a:tabLst/>
+                        <a:defRPr/>
+                      </a:pPr>
+                      <a:r>
+                        <a:rPr kumimoji="0" lang="en-GB" sz="2400" b="0" i="0" u="none" strike="noStrike" kern="1200" cap="none" normalizeH="0" baseline="0" dirty="0" smtClean="0">
+                          <a:ln>
+                            <a:noFill/>
+                          </a:ln>
+                          <a:solidFill>
+                            <a:schemeClr val="tx1"/>
+                          </a:solidFill>
+                          <a:effectLst/>
+                          <a:latin typeface="Arial" pitchFamily="34" charset="0"/>
+                          <a:ea typeface="+mn-ea"/>
+                          <a:cs typeface="Arial" pitchFamily="34" charset="0"/>
+                        </a:rPr>
+                        <a:t>Unit tests written as part of the TDD process  are automatable and can therefore be  used as part of the quality assurance process.</a:t>
+                      </a:r>
+                      <a:endParaRPr kumimoji="0" lang="en-GB" sz="2400" b="0" i="0" u="none" strike="noStrike" kern="1200" cap="none" normalizeH="0" baseline="0" dirty="0" smtClean="0">
                         <a:ln>
                           <a:noFill/>
                         </a:ln>
@@ -15928,8 +16022,61 @@
                           <a:latin typeface="Arial" pitchFamily="34" charset="0"/>
                           <a:cs typeface="Arial" pitchFamily="34" charset="0"/>
                         </a:rPr>
-                        <a:t>The Mantid project, continuous integration master server, hosts Jenkins, an open source derivative of Hudson. The master server contains a list of connected ‘Executor’ hardware as well as a list of virtual Jobs.  When a job is indicates that it is pending, Jenkins finds an appropriate executor and collates the results after the job completes.</a:t>
+                        <a:t>The Mantid project, continuous integration master server, hosts Jenkins, an open source derivative of Hudson. The master server contains a list of connected ‘Executor’ hardware as well as a list of virtual Jobs.  When a job is indicates that it is pending, Jenkins finds an appropriate </a:t>
                       </a:r>
+                      <a:r>
+                        <a:rPr kumimoji="0" lang="en-US" sz="2400" b="0" i="0" u="none" strike="noStrike" kern="0" cap="none" normalizeH="0" baseline="0" dirty="0" smtClean="0">
+                          <a:ln>
+                            <a:noFill/>
+                          </a:ln>
+                          <a:solidFill>
+                            <a:schemeClr val="tx1"/>
+                          </a:solidFill>
+                          <a:effectLst/>
+                          <a:latin typeface="Arial" pitchFamily="34" charset="0"/>
+                          <a:cs typeface="Arial" pitchFamily="34" charset="0"/>
+                        </a:rPr>
+                        <a:t>Executor </a:t>
+                      </a:r>
+                      <a:r>
+                        <a:rPr kumimoji="0" lang="en-US" sz="2400" b="0" i="0" u="none" strike="noStrike" kern="0" cap="none" normalizeH="0" baseline="0" dirty="0" smtClean="0">
+                          <a:ln>
+                            <a:noFill/>
+                          </a:ln>
+                          <a:solidFill>
+                            <a:schemeClr val="tx1"/>
+                          </a:solidFill>
+                          <a:effectLst/>
+                          <a:latin typeface="Arial" pitchFamily="34" charset="0"/>
+                          <a:cs typeface="Arial" pitchFamily="34" charset="0"/>
+                        </a:rPr>
+                        <a:t>and collates the results after the job completes</a:t>
+                      </a:r>
+                      <a:r>
+                        <a:rPr kumimoji="0" lang="en-US" sz="2400" b="0" i="0" u="none" strike="noStrike" kern="0" cap="none" normalizeH="0" baseline="0" dirty="0" smtClean="0">
+                          <a:ln>
+                            <a:noFill/>
+                          </a:ln>
+                          <a:solidFill>
+                            <a:schemeClr val="tx1"/>
+                          </a:solidFill>
+                          <a:effectLst/>
+                          <a:latin typeface="Arial" pitchFamily="34" charset="0"/>
+                          <a:cs typeface="Arial" pitchFamily="34" charset="0"/>
+                        </a:rPr>
+                        <a:t>.</a:t>
+                      </a:r>
+                      <a:endParaRPr kumimoji="0" lang="en-US" sz="2400" b="0" i="0" u="none" strike="noStrike" kern="0" cap="none" normalizeH="0" baseline="0" dirty="0" smtClean="0">
+                        <a:ln>
+                          <a:noFill/>
+                        </a:ln>
+                        <a:solidFill>
+                          <a:schemeClr val="tx1"/>
+                        </a:solidFill>
+                        <a:effectLst/>
+                        <a:latin typeface="Arial" pitchFamily="34" charset="0"/>
+                        <a:cs typeface="Arial" pitchFamily="34" charset="0"/>
+                      </a:endParaRPr>
                     </a:p>
                     <a:p>
                       <a:pPr marL="0" marR="0" lvl="0" indent="0" algn="ctr" defTabSz="4173538" rtl="0" eaLnBrk="1" fontAlgn="base" latinLnBrk="0" hangingPunct="1">
@@ -16899,7 +17046,7 @@
                           <a:solidFill>
                             <a:schemeClr val="tx1"/>
                           </a:solidFill>
-                          <a:latin typeface="Arial" pitchFamily="34" charset="0"/>
+                          <a:latin typeface="+mj-lt"/>
                           <a:ea typeface="+mn-ea"/>
                           <a:cs typeface="Arial" pitchFamily="34" charset="0"/>
                         </a:rPr>
@@ -16910,7 +17057,7 @@
                           <a:solidFill>
                             <a:schemeClr val="tx1"/>
                           </a:solidFill>
-                          <a:latin typeface="Arial" pitchFamily="34" charset="0"/>
+                          <a:latin typeface="+mj-lt"/>
                           <a:ea typeface="+mn-ea"/>
                           <a:cs typeface="Arial" pitchFamily="34" charset="0"/>
                         </a:rPr>
@@ -17207,7 +17354,7 @@
                           <a:solidFill>
                             <a:schemeClr val="tx1"/>
                           </a:solidFill>
-                          <a:latin typeface="Arial" pitchFamily="34" charset="0"/>
+                          <a:latin typeface="+mj-lt"/>
                           <a:ea typeface="+mn-ea"/>
                           <a:cs typeface="Arial" pitchFamily="34" charset="0"/>
                         </a:rPr>
@@ -17218,7 +17365,7 @@
                           <a:solidFill>
                             <a:schemeClr val="tx1"/>
                           </a:solidFill>
-                          <a:latin typeface="Arial" pitchFamily="34" charset="0"/>
+                          <a:latin typeface="+mj-lt"/>
                           <a:ea typeface="+mn-ea"/>
                           <a:cs typeface="Arial" pitchFamily="34" charset="0"/>
                         </a:rPr>
@@ -17611,7 +17758,7 @@
                       </a:endParaRPr>
                     </a:p>
                     <a:p>
-                      <a:pPr marL="0" marR="0" lvl="0" indent="0" algn="l" defTabSz="4173538" rtl="0" eaLnBrk="1" fontAlgn="base" latinLnBrk="0" hangingPunct="1">
+                      <a:pPr marL="0" marR="0" lvl="0" indent="0" algn="ctr" defTabSz="4173538" rtl="0" eaLnBrk="1" fontAlgn="base" latinLnBrk="0" hangingPunct="1">
                         <a:lnSpc>
                           <a:spcPct val="100000"/>
                         </a:lnSpc>
@@ -17633,7 +17780,7 @@
                           <a:solidFill>
                             <a:schemeClr val="tx1"/>
                           </a:solidFill>
-                          <a:latin typeface="Arial" pitchFamily="34" charset="0"/>
+                          <a:latin typeface="+mj-lt"/>
                           <a:ea typeface="+mn-ea"/>
                           <a:cs typeface="Arial" pitchFamily="34" charset="0"/>
                         </a:rPr>
@@ -17644,7 +17791,7 @@
                           <a:solidFill>
                             <a:schemeClr val="tx1"/>
                           </a:solidFill>
-                          <a:latin typeface="Arial" pitchFamily="34" charset="0"/>
+                          <a:latin typeface="+mj-lt"/>
                           <a:ea typeface="+mn-ea"/>
                           <a:cs typeface="Arial" pitchFamily="34" charset="0"/>
                         </a:rPr>
@@ -18212,7 +18359,7 @@
         </p:blipFill>
         <p:spPr bwMode="auto">
           <a:xfrm>
-            <a:off x="20663966" y="33355209"/>
+            <a:off x="20663966" y="33067177"/>
             <a:ext cx="6552728" cy="4962260"/>
           </a:xfrm>
           <a:prstGeom prst="rect">
@@ -19652,19 +19799,6 @@
 </file>
 
 <file path=customXml/item1.xml><?xml version="1.0" encoding="utf-8"?>
-<LongProperties xmlns="http://schemas.microsoft.com/office/2006/metadata/longProperties"/>
-</file>
-
-<file path=customXml/item2.xml><?xml version="1.0" encoding="utf-8"?>
-<?mso-contentType ?>
-<FormTemplates xmlns="http://schemas.microsoft.com/sharepoint/v3/contenttype/forms">
-  <Display>DocumentLibraryForm</Display>
-  <Edit>DocumentLibraryForm</Edit>
-  <New>DocumentLibraryForm</New>
-</FormTemplates>
-</file>
-
-<file path=customXml/item3.xml><?xml version="1.0" encoding="utf-8"?>
 <ct:contentTypeSchema xmlns:ct="http://schemas.microsoft.com/office/2006/metadata/contentType" xmlns:ma="http://schemas.microsoft.com/office/2006/metadata/properties/metaAttributes" ct:_="" ma:_="" ma:contentTypeName="Document" ma:contentTypeID="0x0101000BFEB35FB51C0F42A9A471BD9DD2DD1B" ma:contentTypeVersion="1" ma:contentTypeDescription="Create a new document." ma:contentTypeScope="" ma:versionID="35a5236f1a4e3acf6a385f2c1bfe2746">
   <xsd:schema xmlns:xsd="http://www.w3.org/2001/XMLSchema" xmlns:xs="http://www.w3.org/2001/XMLSchema" xmlns:p="http://schemas.microsoft.com/office/2006/metadata/properties" xmlns:ns1="http://schemas.microsoft.com/sharepoint/v3" targetNamespace="http://schemas.microsoft.com/office/2006/metadata/properties" ma:root="true" ma:fieldsID="a447206dab0015f8b9f8924535193e8c" ns1:_="">
     <xsd:import namespace="http://schemas.microsoft.com/sharepoint/v3"/>
@@ -19796,6 +19930,19 @@
 </ct:contentTypeSchema>
 </file>
 
+<file path=customXml/item2.xml><?xml version="1.0" encoding="utf-8"?>
+<?mso-contentType ?>
+<FormTemplates xmlns="http://schemas.microsoft.com/sharepoint/v3/contenttype/forms">
+  <Display>DocumentLibraryForm</Display>
+  <Edit>DocumentLibraryForm</Edit>
+  <New>DocumentLibraryForm</New>
+</FormTemplates>
+</file>
+
+<file path=customXml/item3.xml><?xml version="1.0" encoding="utf-8"?>
+<LongProperties xmlns="http://schemas.microsoft.com/office/2006/metadata/longProperties"/>
+</file>
+
 <file path=customXml/item4.xml><?xml version="1.0" encoding="utf-8"?>
 <p:properties xmlns:p="http://schemas.microsoft.com/office/2006/metadata/properties" xmlns:xsi="http://www.w3.org/2001/XMLSchema-instance">
   <documentManagement>
@@ -19806,22 +19953,6 @@
 </file>
 
 <file path=customXml/itemProps1.xml><?xml version="1.0" encoding="utf-8"?>
-<ds:datastoreItem xmlns:ds="http://schemas.openxmlformats.org/officeDocument/2006/customXml" ds:itemID="{5593874F-BA98-4A0D-88E6-76DECBDFE515}">
-  <ds:schemaRefs>
-    <ds:schemaRef ds:uri="http://schemas.microsoft.com/office/2006/metadata/longProperties"/>
-  </ds:schemaRefs>
-</ds:datastoreItem>
-</file>
-
-<file path=customXml/itemProps2.xml><?xml version="1.0" encoding="utf-8"?>
-<ds:datastoreItem xmlns:ds="http://schemas.openxmlformats.org/officeDocument/2006/customXml" ds:itemID="{BB870582-39B3-4EE1-B4C9-D3C3087CF0F0}">
-  <ds:schemaRefs>
-    <ds:schemaRef ds:uri="http://schemas.microsoft.com/sharepoint/v3/contenttype/forms"/>
-  </ds:schemaRefs>
-</ds:datastoreItem>
-</file>
-
-<file path=customXml/itemProps3.xml><?xml version="1.0" encoding="utf-8"?>
 <ds:datastoreItem xmlns:ds="http://schemas.openxmlformats.org/officeDocument/2006/customXml" ds:itemID="{3B5FA4EA-6C34-4AED-AF36-BD45CB995C14}">
   <ds:schemaRefs>
     <ds:schemaRef ds:uri="http://schemas.microsoft.com/office/2006/metadata/contentType"/>
@@ -19839,6 +19970,22 @@
 </ds:datastoreItem>
 </file>
 
+<file path=customXml/itemProps2.xml><?xml version="1.0" encoding="utf-8"?>
+<ds:datastoreItem xmlns:ds="http://schemas.openxmlformats.org/officeDocument/2006/customXml" ds:itemID="{BB870582-39B3-4EE1-B4C9-D3C3087CF0F0}">
+  <ds:schemaRefs>
+    <ds:schemaRef ds:uri="http://schemas.microsoft.com/sharepoint/v3/contenttype/forms"/>
+  </ds:schemaRefs>
+</ds:datastoreItem>
+</file>
+
+<file path=customXml/itemProps3.xml><?xml version="1.0" encoding="utf-8"?>
+<ds:datastoreItem xmlns:ds="http://schemas.openxmlformats.org/officeDocument/2006/customXml" ds:itemID="{5593874F-BA98-4A0D-88E6-76DECBDFE515}">
+  <ds:schemaRefs>
+    <ds:schemaRef ds:uri="http://schemas.microsoft.com/office/2006/metadata/longProperties"/>
+  </ds:schemaRefs>
+</ds:datastoreItem>
+</file>
+
 <file path=customXml/itemProps4.xml><?xml version="1.0" encoding="utf-8"?>
 <ds:datastoreItem xmlns:ds="http://schemas.openxmlformats.org/officeDocument/2006/customXml" ds:itemID="{BBE466B2-E11B-4338-AFEC-553026806900}">
   <ds:schemaRefs>

</xml_diff>

<commit_message>
formatting changes and remove template
</commit_message>
<xml_diff>
--- a/Presentations/NOBUGS 2012/Posters/Continuous Build Test and Deploy/continuous_build_test_and_deployment_Poster.pptx
+++ b/Presentations/NOBUGS 2012/Posters/Continuous Build Test and Deploy/continuous_build_test_and_deployment_Poster.pptx
@@ -3926,8 +3926,8 @@
     <dgm:cxn modelId="{C7E40448-4A1B-40E1-B799-EF1206922594}" type="presOf" srcId="{64867E98-0E49-4520-99BC-30634715AFCD}" destId="{0F8AA12B-E1BA-40D2-A352-F50328A12118}" srcOrd="0" destOrd="0" presId="urn:microsoft.com/office/officeart/2005/8/layout/radial2"/>
     <dgm:cxn modelId="{96C131DC-1F5A-46CD-9DBF-82D3EC03814C}" srcId="{F8990D85-BF06-4EA2-9F60-E1F5FB69B284}" destId="{ACC50FC6-7030-41C6-B46B-C92BB0B23ED2}" srcOrd="1" destOrd="0" parTransId="{6AD11D59-04DA-40FB-A110-7E7B2E11475E}" sibTransId="{A11FF837-24A0-44A6-A7EE-7D90D4B90DBF}"/>
     <dgm:cxn modelId="{8A1BB4CE-9E9D-4EE6-AEE2-7184D07692E0}" type="presOf" srcId="{542B92E1-909B-4E6F-A87D-F3E4AA6609EF}" destId="{AE3763E3-7B38-48D8-9EE4-AC7E8664E0D8}" srcOrd="0" destOrd="0" presId="urn:microsoft.com/office/officeart/2005/8/layout/radial2"/>
+    <dgm:cxn modelId="{2571E549-A55F-4029-94E2-F9903A9AE197}" type="presOf" srcId="{ED6F155E-3785-4A71-B853-339F83E7D0E6}" destId="{4C5EC015-157D-4B48-B696-46C687FD307E}" srcOrd="0" destOrd="1" presId="urn:microsoft.com/office/officeart/2005/8/layout/radial2"/>
     <dgm:cxn modelId="{FB997BBB-F47E-4D7B-9EB1-04F260C0033A}" type="presOf" srcId="{6AD11D59-04DA-40FB-A110-7E7B2E11475E}" destId="{B50987D1-79F0-4F98-BF04-A3ECAFE35217}" srcOrd="0" destOrd="0" presId="urn:microsoft.com/office/officeart/2005/8/layout/radial2"/>
-    <dgm:cxn modelId="{2571E549-A55F-4029-94E2-F9903A9AE197}" type="presOf" srcId="{ED6F155E-3785-4A71-B853-339F83E7D0E6}" destId="{4C5EC015-157D-4B48-B696-46C687FD307E}" srcOrd="0" destOrd="1" presId="urn:microsoft.com/office/officeart/2005/8/layout/radial2"/>
     <dgm:cxn modelId="{13BEAA66-AB4F-420F-AD0E-F1E5EB39733A}" type="presOf" srcId="{C7E23AF7-4DB2-47A4-9740-3957E8BA9624}" destId="{CEA09B7C-9DB3-44CD-A2C2-9D740ADA80BE}" srcOrd="0" destOrd="0" presId="urn:microsoft.com/office/officeart/2005/8/layout/radial2"/>
     <dgm:cxn modelId="{7A74C88E-26D5-403E-9F82-ABFA3FB52C47}" type="presOf" srcId="{6726BAD5-A5E6-47B1-9C52-F294E0B1097B}" destId="{4C5EC015-157D-4B48-B696-46C687FD307E}" srcOrd="0" destOrd="0" presId="urn:microsoft.com/office/officeart/2005/8/layout/radial2"/>
     <dgm:cxn modelId="{AE212A5D-1764-4958-98CD-107FB056F506}" type="presOf" srcId="{85C090C1-022A-4756-8CF4-80AF227D155F}" destId="{C2EE49FF-D9D3-4A35-ABC9-BD17EC65C4F1}" srcOrd="0" destOrd="0" presId="urn:microsoft.com/office/officeart/2005/8/layout/radial2"/>
@@ -13268,7 +13268,7 @@
         </p:nvGraphicFramePr>
         <p:xfrm>
           <a:off x="1066800" y="8610599"/>
-          <a:ext cx="28194000" cy="30595824"/>
+          <a:ext cx="28194000" cy="30961584"/>
         </p:xfrm>
         <a:graphic>
           <a:graphicData uri="http://schemas.openxmlformats.org/drawingml/2006/table">
@@ -14855,21 +14855,7 @@
                           <a:latin typeface="Arial" pitchFamily="34" charset="0"/>
                           <a:cs typeface="Arial" pitchFamily="34" charset="0"/>
                         </a:rPr>
-                        <a:t>Test driven development  (TDD) is a development methodology, which generally leads to better quality code with, increased cohesion and better decoupling. We find that the bi-product of the process, the test suite, is usually more comprehensive and has a better ability to pinpoint failure than test suites generated </a:t>
-                      </a:r>
-                      <a:r>
-                        <a:rPr kumimoji="0" lang="en-US" sz="2400" b="0" i="0" u="none" strike="noStrike" kern="0" cap="none" normalizeH="0" baseline="0" dirty="0" smtClean="0">
-                          <a:ln>
-                            <a:noFill/>
-                          </a:ln>
-                          <a:solidFill>
-                            <a:schemeClr val="tx1"/>
-                          </a:solidFill>
-                          <a:effectLst/>
-                          <a:latin typeface="Arial" pitchFamily="34" charset="0"/>
-                          <a:cs typeface="Arial" pitchFamily="34" charset="0"/>
-                        </a:rPr>
-                        <a:t>post-development</a:t>
+                        <a:t>Test driven development  (TDD) is a development methodology, which generally leads to better quality code with, increased cohesion and better decoupling. We find that the bi-product of the process, the test suite, is usually more comprehensive and has a better ability to pinpoint failure than test suites generated post-development</a:t>
                       </a:r>
                     </a:p>
                     <a:p>
@@ -15392,21 +15378,7 @@
                           <a:latin typeface="Arial" pitchFamily="34" charset="0"/>
                           <a:cs typeface="Arial" pitchFamily="34" charset="0"/>
                         </a:rPr>
-                        <a:t> Mocking framework. Mocking is a very powerful technique, which is highly complementary to the TDD process. Mocking interfaces allows tests to be isolated and allows TDD to proceed against parts of the codebase that do not yet exist. We find that a combination of  Mocking and TDD, rather than TDD alone, leads to tests suites with higher coverage, better reporting and faster execution times than is otherwise possible. Striving for mocking as part of the TDD process naturally leads to dependency injection and low coupling in the resultant code</a:t>
-                      </a:r>
-                      <a:r>
-                        <a:rPr kumimoji="0" lang="en-US" sz="2400" b="0" i="0" u="none" strike="noStrike" kern="0" cap="none" normalizeH="0" baseline="0" dirty="0" smtClean="0">
-                          <a:ln>
-                            <a:noFill/>
-                          </a:ln>
-                          <a:solidFill>
-                            <a:schemeClr val="tx1"/>
-                          </a:solidFill>
-                          <a:effectLst/>
-                          <a:latin typeface="Arial" pitchFamily="34" charset="0"/>
-                          <a:cs typeface="Arial" pitchFamily="34" charset="0"/>
-                        </a:rPr>
-                        <a:t>.</a:t>
+                        <a:t> Mocking framework. Mocking is a very powerful technique, which is highly complementary to the TDD process. Mocking interfaces allows tests to be isolated and allows TDD to proceed against parts of the codebase that do not yet exist. We find that a combination of  Mocking and TDD, rather than TDD alone, leads to tests suites with higher coverage, better reporting and faster execution times than is otherwise possible. Striving for mocking as part of the TDD process naturally leads to dependency injection and low coupling in the resultant code.</a:t>
                       </a:r>
                     </a:p>
                     <a:p>
@@ -15966,21 +15938,7 @@
                           <a:latin typeface="+mj-lt"/>
                           <a:cs typeface="Arial" pitchFamily="34" charset="0"/>
                         </a:rPr>
-                        <a:t>Continuous </a:t>
-                      </a:r>
-                      <a:r>
-                        <a:rPr kumimoji="0" lang="en-US" sz="5000" b="0" i="0" u="none" strike="noStrike" kern="0" cap="none" normalizeH="0" baseline="0" dirty="0" smtClean="0">
-                          <a:ln>
-                            <a:noFill/>
-                          </a:ln>
-                          <a:solidFill>
-                            <a:srgbClr val="002D55"/>
-                          </a:solidFill>
-                          <a:effectLst/>
-                          <a:latin typeface="+mj-lt"/>
-                          <a:cs typeface="Arial" pitchFamily="34" charset="0"/>
-                        </a:rPr>
-                        <a:t>Integration Server</a:t>
+                        <a:t>Continuous Integration Server</a:t>
                       </a:r>
                     </a:p>
                     <a:p>
@@ -17793,27 +17751,8 @@
                           <a:ea typeface="+mn-ea"/>
                           <a:cs typeface="Arial" pitchFamily="34" charset="0"/>
                         </a:rPr>
-                        <a:t> test </a:t>
+                        <a:t> test report showing a large improvement in performance for a task from over 11 seconds to under ½ a second.</a:t>
                       </a:r>
-                      <a:r>
-                        <a:rPr lang="en-GB" sz="2400" i="1" kern="1200" baseline="0" dirty="0" smtClean="0">
-                          <a:solidFill>
-                            <a:schemeClr val="tx1"/>
-                          </a:solidFill>
-                          <a:latin typeface="+mj-lt"/>
-                          <a:ea typeface="+mn-ea"/>
-                          <a:cs typeface="Arial" pitchFamily="34" charset="0"/>
-                        </a:rPr>
-                        <a:t>report showing a large improvement in performance for a task from over 11 seconds to under ½ a second.</a:t>
-                      </a:r>
-                      <a:endParaRPr lang="en-GB" sz="2400" i="1" kern="1200" baseline="0" dirty="0" smtClean="0">
-                        <a:solidFill>
-                          <a:schemeClr val="tx1"/>
-                        </a:solidFill>
-                        <a:latin typeface="+mj-lt"/>
-                        <a:ea typeface="+mn-ea"/>
-                        <a:cs typeface="Arial" pitchFamily="34" charset="0"/>
-                      </a:endParaRPr>
                     </a:p>
                     <a:p>
                       <a:pPr marL="0" marR="0" lvl="0" indent="0" algn="l" defTabSz="4173538" rtl="0" eaLnBrk="1" fontAlgn="base" latinLnBrk="0" hangingPunct="1">
@@ -18056,30 +17995,24 @@
             <a:pPr algn="ctr"/>
             <a:r>
               <a:rPr lang="en-GB" sz="6000" b="1" dirty="0" smtClean="0">
-                <a:latin typeface="Corisande" pitchFamily="2" charset="0"/>
+                <a:latin typeface="Arial" pitchFamily="34" charset="0"/>
+                <a:cs typeface="Arial" pitchFamily="34" charset="0"/>
               </a:rPr>
               <a:t>Continuous Build, Test and Deployment </a:t>
             </a:r>
-            <a:endParaRPr lang="en-GB" sz="6000" b="1" dirty="0" smtClean="0">
-              <a:latin typeface="Corisande" pitchFamily="2" charset="0"/>
-            </a:endParaRPr>
           </a:p>
           <a:p>
             <a:pPr algn="ctr"/>
             <a:r>
               <a:rPr lang="en-GB" sz="6000" b="1" dirty="0" smtClean="0">
-                <a:latin typeface="Corisande" pitchFamily="2" charset="0"/>
+                <a:latin typeface="Arial" pitchFamily="34" charset="0"/>
+                <a:cs typeface="Arial" pitchFamily="34" charset="0"/>
               </a:rPr>
-              <a:t>The </a:t>
-            </a:r>
-            <a:r>
-              <a:rPr lang="en-GB" sz="6000" b="1" dirty="0" smtClean="0">
-                <a:latin typeface="Corisande" pitchFamily="2" charset="0"/>
-              </a:rPr>
-              <a:t>Mantid Model</a:t>
+              <a:t>The Mantid Model</a:t>
             </a:r>
             <a:endParaRPr lang="en-GB" sz="6000" b="1" dirty="0">
-              <a:latin typeface="Corisande" pitchFamily="2" charset="0"/>
+              <a:latin typeface="Arial" pitchFamily="34" charset="0"/>
+              <a:cs typeface="Arial" pitchFamily="34" charset="0"/>
             </a:endParaRPr>
           </a:p>
         </p:txBody>
@@ -19789,19 +19722,6 @@
 </file>
 
 <file path=customXml/item1.xml><?xml version="1.0" encoding="utf-8"?>
-<LongProperties xmlns="http://schemas.microsoft.com/office/2006/metadata/longProperties"/>
-</file>
-
-<file path=customXml/item2.xml><?xml version="1.0" encoding="utf-8"?>
-<?mso-contentType ?>
-<FormTemplates xmlns="http://schemas.microsoft.com/sharepoint/v3/contenttype/forms">
-  <Display>DocumentLibraryForm</Display>
-  <Edit>DocumentLibraryForm</Edit>
-  <New>DocumentLibraryForm</New>
-</FormTemplates>
-</file>
-
-<file path=customXml/item3.xml><?xml version="1.0" encoding="utf-8"?>
 <ct:contentTypeSchema xmlns:ct="http://schemas.microsoft.com/office/2006/metadata/contentType" xmlns:ma="http://schemas.microsoft.com/office/2006/metadata/properties/metaAttributes" ct:_="" ma:_="" ma:contentTypeName="Document" ma:contentTypeID="0x0101000BFEB35FB51C0F42A9A471BD9DD2DD1B" ma:contentTypeVersion="1" ma:contentTypeDescription="Create a new document." ma:contentTypeScope="" ma:versionID="35a5236f1a4e3acf6a385f2c1bfe2746">
   <xsd:schema xmlns:xsd="http://www.w3.org/2001/XMLSchema" xmlns:xs="http://www.w3.org/2001/XMLSchema" xmlns:p="http://schemas.microsoft.com/office/2006/metadata/properties" xmlns:ns1="http://schemas.microsoft.com/sharepoint/v3" targetNamespace="http://schemas.microsoft.com/office/2006/metadata/properties" ma:root="true" ma:fieldsID="a447206dab0015f8b9f8924535193e8c" ns1:_="">
     <xsd:import namespace="http://schemas.microsoft.com/sharepoint/v3"/>
@@ -19933,6 +19853,19 @@
 </ct:contentTypeSchema>
 </file>
 
+<file path=customXml/item2.xml><?xml version="1.0" encoding="utf-8"?>
+<?mso-contentType ?>
+<FormTemplates xmlns="http://schemas.microsoft.com/sharepoint/v3/contenttype/forms">
+  <Display>DocumentLibraryForm</Display>
+  <Edit>DocumentLibraryForm</Edit>
+  <New>DocumentLibraryForm</New>
+</FormTemplates>
+</file>
+
+<file path=customXml/item3.xml><?xml version="1.0" encoding="utf-8"?>
+<LongProperties xmlns="http://schemas.microsoft.com/office/2006/metadata/longProperties"/>
+</file>
+
 <file path=customXml/item4.xml><?xml version="1.0" encoding="utf-8"?>
 <p:properties xmlns:p="http://schemas.microsoft.com/office/2006/metadata/properties" xmlns:xsi="http://www.w3.org/2001/XMLSchema-instance">
   <documentManagement>
@@ -19943,22 +19876,6 @@
 </file>
 
 <file path=customXml/itemProps1.xml><?xml version="1.0" encoding="utf-8"?>
-<ds:datastoreItem xmlns:ds="http://schemas.openxmlformats.org/officeDocument/2006/customXml" ds:itemID="{5593874F-BA98-4A0D-88E6-76DECBDFE515}">
-  <ds:schemaRefs>
-    <ds:schemaRef ds:uri="http://schemas.microsoft.com/office/2006/metadata/longProperties"/>
-  </ds:schemaRefs>
-</ds:datastoreItem>
-</file>
-
-<file path=customXml/itemProps2.xml><?xml version="1.0" encoding="utf-8"?>
-<ds:datastoreItem xmlns:ds="http://schemas.openxmlformats.org/officeDocument/2006/customXml" ds:itemID="{BB870582-39B3-4EE1-B4C9-D3C3087CF0F0}">
-  <ds:schemaRefs>
-    <ds:schemaRef ds:uri="http://schemas.microsoft.com/sharepoint/v3/contenttype/forms"/>
-  </ds:schemaRefs>
-</ds:datastoreItem>
-</file>
-
-<file path=customXml/itemProps3.xml><?xml version="1.0" encoding="utf-8"?>
 <ds:datastoreItem xmlns:ds="http://schemas.openxmlformats.org/officeDocument/2006/customXml" ds:itemID="{3B5FA4EA-6C34-4AED-AF36-BD45CB995C14}">
   <ds:schemaRefs>
     <ds:schemaRef ds:uri="http://schemas.microsoft.com/office/2006/metadata/contentType"/>
@@ -19976,6 +19893,22 @@
 </ds:datastoreItem>
 </file>
 
+<file path=customXml/itemProps2.xml><?xml version="1.0" encoding="utf-8"?>
+<ds:datastoreItem xmlns:ds="http://schemas.openxmlformats.org/officeDocument/2006/customXml" ds:itemID="{BB870582-39B3-4EE1-B4C9-D3C3087CF0F0}">
+  <ds:schemaRefs>
+    <ds:schemaRef ds:uri="http://schemas.microsoft.com/sharepoint/v3/contenttype/forms"/>
+  </ds:schemaRefs>
+</ds:datastoreItem>
+</file>
+
+<file path=customXml/itemProps3.xml><?xml version="1.0" encoding="utf-8"?>
+<ds:datastoreItem xmlns:ds="http://schemas.openxmlformats.org/officeDocument/2006/customXml" ds:itemID="{5593874F-BA98-4A0D-88E6-76DECBDFE515}">
+  <ds:schemaRefs>
+    <ds:schemaRef ds:uri="http://schemas.microsoft.com/office/2006/metadata/longProperties"/>
+  </ds:schemaRefs>
+</ds:datastoreItem>
+</file>
+
 <file path=customXml/itemProps4.xml><?xml version="1.0" encoding="utf-8"?>
 <ds:datastoreItem xmlns:ds="http://schemas.openxmlformats.org/officeDocument/2006/customXml" ds:itemID="{BBE466B2-E11B-4338-AFEC-553026806900}">
   <ds:schemaRefs>

</xml_diff>